<commit_message>
Dokumentation und PowerPoint eingefügt
</commit_message>
<xml_diff>
--- a/Doc/Power Point Projeckt.pptx
+++ b/Doc/Power Point Projeckt.pptx
@@ -8764,7 +8764,7 @@
               <a:buNone/>
             </a:pPr>
             <a:r>
-              <a:rPr lang="en-US" sz="2400" kern="1200" dirty="0">
+              <a:rPr lang="en-US" sz="2400" kern="1200">
                 <a:solidFill>
                   <a:schemeClr val="tx1"/>
                 </a:solidFill>
@@ -8773,9 +8773,16 @@
                 <a:cs typeface="+mn-cs"/>
                 <a:hlinkClick r:id="rId2"/>
               </a:rPr>
-              <a:t>https://williamh2003.github.io/tropicaltreesit/index.html</a:t>
+              <a:t>https://ict-csbe-ch.github.io/mod-101-inf20-william-hockley/</a:t>
             </a:r>
-            <a:endParaRPr lang="en-US" sz="2400" dirty="0"/>
+            <a:endParaRPr lang="en-US" sz="2400" kern="1200">
+              <a:solidFill>
+                <a:schemeClr val="tx1"/>
+              </a:solidFill>
+              <a:latin typeface="+mn-lt"/>
+              <a:ea typeface="+mn-ea"/>
+              <a:cs typeface="+mn-cs"/>
+            </a:endParaRPr>
           </a:p>
           <a:p>
             <a:pPr marL="0" indent="0">

</xml_diff>